<commit_message>
[ay-2022-23] updated lesson 1.
</commit_message>
<xml_diff>
--- a/lab_01-git/material/terminal_primer.pptx
+++ b/lab_01-git/material/terminal_primer.pptx
@@ -213,7 +213,7 @@
           <a:p>
             <a:fld id="{81C4B3FE-0320-8142-8396-5C3025C019EC}" type="datetimeFigureOut">
               <a:rPr lang="en-IT" smtClean="0"/>
-              <a:t>02/03/22</a:t>
+              <a:t>20/10/22</a:t>
             </a:fld>
             <a:endParaRPr lang="en-IT"/>
           </a:p>
@@ -1526,7 +1526,7 @@
             </a:pPr>
             <a:r>
               <a:rPr lang="it-IT" sz="2800" dirty="0"/>
-              <a:t>A.Y. 2021-2022</a:t>
+              <a:t>A.Y. 2022-2023</a:t>
             </a:r>
           </a:p>
         </p:txBody>

</xml_diff>

<commit_message>
[master] updated lab lesons up to lab 4
</commit_message>
<xml_diff>
--- a/lab_01-git/material/terminal_primer.pptx
+++ b/lab_01-git/material/terminal_primer.pptx
@@ -213,7 +213,7 @@
           <a:p>
             <a:fld id="{81C4B3FE-0320-8142-8396-5C3025C019EC}" type="datetimeFigureOut">
               <a:rPr lang="en-IT" smtClean="0"/>
-              <a:t>20/10/22</a:t>
+              <a:t>1/30/24</a:t>
             </a:fld>
             <a:endParaRPr lang="en-IT"/>
           </a:p>
@@ -1526,7 +1526,7 @@
             </a:pPr>
             <a:r>
               <a:rPr lang="it-IT" sz="2800" dirty="0"/>
-              <a:t>A.Y. 2022-2023</a:t>
+              <a:t>A.Y. 2023-2024</a:t>
             </a:r>
           </a:p>
         </p:txBody>

</xml_diff>

<commit_message>
updated lab 1 to #17
</commit_message>
<xml_diff>
--- a/lab_01-git/material/terminal_primer.pptx
+++ b/lab_01-git/material/terminal_primer.pptx
@@ -213,7 +213,7 @@
           <a:p>
             <a:fld id="{81C4B3FE-0320-8142-8396-5C3025C019EC}" type="datetimeFigureOut">
               <a:rPr lang="en-IT" smtClean="0"/>
-              <a:t>1/30/24</a:t>
+              <a:t>2/11/25</a:t>
             </a:fld>
             <a:endParaRPr lang="en-IT"/>
           </a:p>
@@ -1263,7 +1263,9 @@
           <a:lstStyle>
             <a:lvl1pPr marL="0" indent="0" algn="ctr">
               <a:buNone/>
-              <a:defRPr sz="4800" b="1"/>
+              <a:defRPr sz="4800" b="1">
+                <a:latin typeface="Aptos" panose="020B0004020202020204" pitchFamily="34" charset="0"/>
+              </a:defRPr>
             </a:lvl1pPr>
             <a:lvl2pPr marL="457200" indent="0" algn="ctr">
               <a:buNone/>
@@ -1349,7 +1351,9 @@
           <a:lstStyle/>
           <a:p>
             <a:pPr algn="ctr"/>
-            <a:endParaRPr lang="en-GB" dirty="0"/>
+            <a:endParaRPr lang="en-GB" dirty="0">
+              <a:latin typeface="Aptos" panose="020B0004020202020204" pitchFamily="34" charset="0"/>
+            </a:endParaRPr>
           </a:p>
         </p:txBody>
       </p:sp>
@@ -1399,7 +1403,9 @@
           <a:lstStyle/>
           <a:p>
             <a:pPr algn="ctr"/>
-            <a:endParaRPr lang="en-GB" dirty="0"/>
+            <a:endParaRPr lang="en-GB" dirty="0">
+              <a:latin typeface="Aptos" panose="020B0004020202020204" pitchFamily="34" charset="0"/>
+            </a:endParaRPr>
           </a:p>
         </p:txBody>
       </p:sp>
@@ -1445,36 +1451,52 @@
           </a:lstStyle>
           <a:p>
             <a:r>
-              <a:rPr lang="it-IT" sz="2800" b="0" dirty="0" err="1"/>
+              <a:rPr lang="it-IT" sz="2800" b="0" dirty="0" err="1">
+                <a:latin typeface="Aptos" panose="020B0004020202020204" pitchFamily="34" charset="0"/>
+              </a:rPr>
               <a:t>Biomedical</a:t>
             </a:r>
             <a:r>
-              <a:rPr lang="it-IT" sz="2800" b="0" dirty="0"/>
+              <a:rPr lang="it-IT" sz="2800" b="0" dirty="0">
+                <a:latin typeface="Aptos" panose="020B0004020202020204" pitchFamily="34" charset="0"/>
+              </a:rPr>
               <a:t> </a:t>
             </a:r>
             <a:r>
-              <a:rPr lang="it-IT" sz="2800" b="0" dirty="0" err="1"/>
+              <a:rPr lang="it-IT" sz="2800" b="0" dirty="0" err="1">
+                <a:latin typeface="Aptos" panose="020B0004020202020204" pitchFamily="34" charset="0"/>
+              </a:rPr>
               <a:t>Wearable</a:t>
             </a:r>
             <a:r>
-              <a:rPr lang="it-IT" sz="2800" b="0" dirty="0"/>
+              <a:rPr lang="it-IT" sz="2800" b="0" dirty="0">
+                <a:latin typeface="Aptos" panose="020B0004020202020204" pitchFamily="34" charset="0"/>
+              </a:rPr>
               <a:t> Technologies </a:t>
             </a:r>
           </a:p>
           <a:p>
             <a:r>
-              <a:rPr lang="it-IT" sz="2800" b="0" dirty="0"/>
+              <a:rPr lang="it-IT" sz="2800" b="0" dirty="0">
+                <a:latin typeface="Aptos" panose="020B0004020202020204" pitchFamily="34" charset="0"/>
+              </a:rPr>
               <a:t>for Healthcare and </a:t>
             </a:r>
             <a:r>
-              <a:rPr lang="it-IT" sz="2800" b="0" dirty="0" err="1"/>
+              <a:rPr lang="it-IT" sz="2800" b="0" dirty="0" err="1">
+                <a:latin typeface="Aptos" panose="020B0004020202020204" pitchFamily="34" charset="0"/>
+              </a:rPr>
               <a:t>Wellbeing</a:t>
             </a:r>
             <a:r>
-              <a:rPr lang="it-IT" sz="2800" b="0" dirty="0"/>
+              <a:rPr lang="it-IT" sz="2800" b="0" dirty="0">
+                <a:latin typeface="Aptos" panose="020B0004020202020204" pitchFamily="34" charset="0"/>
+              </a:rPr>
               <a:t>  </a:t>
             </a:r>
-            <a:endParaRPr lang="en-GB" sz="2800" b="0" dirty="0"/>
+            <a:endParaRPr lang="en-GB" sz="2800" b="0" dirty="0">
+              <a:latin typeface="Aptos" panose="020B0004020202020204" pitchFamily="34" charset="0"/>
+            </a:endParaRPr>
           </a:p>
         </p:txBody>
       </p:sp>
@@ -1525,8 +1547,10 @@
               </a:spcAft>
             </a:pPr>
             <a:r>
-              <a:rPr lang="it-IT" sz="2800" dirty="0"/>
-              <a:t>A.Y. 2023-2024</a:t>
+              <a:rPr lang="it-IT" sz="2800" dirty="0">
+                <a:latin typeface="Aptos" panose="020B0004020202020204" pitchFamily="34" charset="0"/>
+              </a:rPr>
+              <a:t>A.Y. 2024-2025</a:t>
             </a:r>
           </a:p>
         </p:txBody>
@@ -1565,7 +1589,7 @@
                 <a:effectLst/>
                 <a:uLnTx/>
                 <a:uFillTx/>
-                <a:latin typeface="Palatino Linotype" panose="02040502050505030304" pitchFamily="18" charset="0"/>
+                <a:latin typeface="Aptos" panose="020B0004020202020204" pitchFamily="34" charset="0"/>
                 <a:ea typeface="+mj-ea"/>
                 <a:cs typeface="+mj-cs"/>
               </a:rPr>
@@ -1582,7 +1606,7 @@
                 <a:effectLst/>
                 <a:uLnTx/>
                 <a:uFillTx/>
-                <a:latin typeface="Palatino Linotype" panose="02040502050505030304" pitchFamily="18" charset="0"/>
+                <a:latin typeface="Aptos" panose="020B0004020202020204" pitchFamily="34" charset="0"/>
                 <a:ea typeface="+mj-ea"/>
                 <a:cs typeface="+mj-cs"/>
               </a:rPr>
@@ -1599,7 +1623,7 @@
                 <a:effectLst/>
                 <a:uLnTx/>
                 <a:uFillTx/>
-                <a:latin typeface="Palatino Linotype" panose="02040502050505030304" pitchFamily="18" charset="0"/>
+                <a:latin typeface="Aptos" panose="020B0004020202020204" pitchFamily="34" charset="0"/>
                 <a:ea typeface="+mj-ea"/>
                 <a:cs typeface="+mj-cs"/>
               </a:rPr>
@@ -1615,7 +1639,7 @@
                 <a:effectLst/>
                 <a:uLnTx/>
                 <a:uFillTx/>
-                <a:latin typeface="Palatino Linotype" panose="02040502050505030304" pitchFamily="18" charset="0"/>
+                <a:latin typeface="Aptos" panose="020B0004020202020204" pitchFamily="34" charset="0"/>
                 <a:ea typeface="+mj-ea"/>
                 <a:cs typeface="+mj-cs"/>
               </a:rPr>
@@ -1632,7 +1656,7 @@
                 <a:effectLst/>
                 <a:uLnTx/>
                 <a:uFillTx/>
-                <a:latin typeface="Palatino Linotype" panose="02040502050505030304" pitchFamily="18" charset="0"/>
+                <a:latin typeface="Aptos" panose="020B0004020202020204" pitchFamily="34" charset="0"/>
                 <a:ea typeface="+mj-ea"/>
                 <a:cs typeface="+mj-cs"/>
               </a:rPr>
@@ -1649,13 +1673,15 @@
                 <a:effectLst/>
                 <a:uLnTx/>
                 <a:uFillTx/>
-                <a:latin typeface="Palatino Linotype" panose="02040502050505030304" pitchFamily="18" charset="0"/>
+                <a:latin typeface="Aptos" panose="020B0004020202020204" pitchFamily="34" charset="0"/>
                 <a:ea typeface="+mj-ea"/>
                 <a:cs typeface="+mj-cs"/>
               </a:rPr>
               <a:t>Engineering</a:t>
             </a:r>
-            <a:endParaRPr lang="en-GB" sz="1100" cap="small" baseline="0" dirty="0"/>
+            <a:endParaRPr lang="en-GB" sz="1100" cap="small" baseline="0" dirty="0">
+              <a:latin typeface="Aptos" panose="020B0004020202020204" pitchFamily="34" charset="0"/>
+            </a:endParaRPr>
           </a:p>
         </p:txBody>
       </p:sp>
@@ -1765,7 +1791,9 @@
           </a:bodyPr>
           <a:lstStyle>
             <a:lvl1pPr>
-              <a:defRPr sz="3200"/>
+              <a:defRPr sz="3200">
+                <a:latin typeface="Aptos" panose="020B0004020202020204" pitchFamily="34" charset="0"/>
+              </a:defRPr>
             </a:lvl1pPr>
           </a:lstStyle>
           <a:p>
@@ -1795,10 +1823,17 @@
         <p:spPr/>
         <p:txBody>
           <a:bodyPr/>
-          <a:lstStyle/>
+          <a:lstStyle>
+            <a:lvl1pPr>
+              <a:defRPr>
+                <a:latin typeface="Aptos" panose="020B0004020202020204" pitchFamily="34" charset="0"/>
+              </a:defRPr>
+            </a:lvl1pPr>
+          </a:lstStyle>
           <a:p>
             <a:fld id="{31DE2C5B-556E-47B8-A792-024C2FCA4ACC}" type="slidenum">
               <a:rPr lang="en-GB" smtClean="0"/>
+              <a:pPr/>
               <a:t>‹#›</a:t>
             </a:fld>
             <a:endParaRPr lang="en-GB"/>
@@ -2194,12 +2229,14 @@
                     <a:tint val="75000"/>
                   </a:schemeClr>
                 </a:solidFill>
+                <a:latin typeface="Aptos" panose="020B0004020202020204" pitchFamily="34" charset="0"/>
               </a:defRPr>
             </a:lvl1pPr>
           </a:lstStyle>
           <a:p>
             <a:fld id="{31DE2C5B-556E-47B8-A792-024C2FCA4ACC}" type="slidenum">
               <a:rPr lang="en-GB" smtClean="0"/>
+              <a:pPr/>
               <a:t>‹#›</a:t>
             </a:fld>
             <a:endParaRPr lang="en-GB"/>
@@ -2235,7 +2272,7 @@
           <a:solidFill>
             <a:schemeClr val="tx1"/>
           </a:solidFill>
-          <a:latin typeface="Palatino Linotype" panose="02040502050505030304" pitchFamily="18" charset="0"/>
+          <a:latin typeface="Aptos" panose="020B0004020202020204" pitchFamily="34" charset="0"/>
           <a:ea typeface="+mj-ea"/>
           <a:cs typeface="+mj-cs"/>
         </a:defRPr>
@@ -2258,7 +2295,7 @@
           <a:solidFill>
             <a:schemeClr val="tx1"/>
           </a:solidFill>
-          <a:latin typeface="Palatino Linotype" panose="02040502050505030304" pitchFamily="18" charset="0"/>
+          <a:latin typeface="Aptos" panose="020B0004020202020204" pitchFamily="34" charset="0"/>
           <a:ea typeface="+mn-ea"/>
           <a:cs typeface="+mn-cs"/>
         </a:defRPr>
@@ -2279,7 +2316,7 @@
           <a:solidFill>
             <a:schemeClr val="tx1"/>
           </a:solidFill>
-          <a:latin typeface="Palatino Linotype" panose="02040502050505030304" pitchFamily="18" charset="0"/>
+          <a:latin typeface="Aptos" panose="020B0004020202020204" pitchFamily="34" charset="0"/>
           <a:ea typeface="+mn-ea"/>
           <a:cs typeface="+mn-cs"/>
         </a:defRPr>
@@ -2300,7 +2337,7 @@
           <a:solidFill>
             <a:schemeClr val="tx1"/>
           </a:solidFill>
-          <a:latin typeface="Palatino Linotype" panose="02040502050505030304" pitchFamily="18" charset="0"/>
+          <a:latin typeface="Aptos" panose="020B0004020202020204" pitchFamily="34" charset="0"/>
           <a:ea typeface="+mn-ea"/>
           <a:cs typeface="+mn-cs"/>
         </a:defRPr>
@@ -2321,7 +2358,7 @@
           <a:solidFill>
             <a:schemeClr val="tx1"/>
           </a:solidFill>
-          <a:latin typeface="Palatino Linotype" panose="02040502050505030304" pitchFamily="18" charset="0"/>
+          <a:latin typeface="Aptos" panose="020B0004020202020204" pitchFamily="34" charset="0"/>
           <a:ea typeface="+mn-ea"/>
           <a:cs typeface="+mn-cs"/>
         </a:defRPr>
@@ -2342,7 +2379,7 @@
           <a:solidFill>
             <a:schemeClr val="tx1"/>
           </a:solidFill>
-          <a:latin typeface="Palatino Linotype" panose="02040502050505030304" pitchFamily="18" charset="0"/>
+          <a:latin typeface="Aptos" panose="020B0004020202020204" pitchFamily="34" charset="0"/>
           <a:ea typeface="+mn-ea"/>
           <a:cs typeface="+mn-cs"/>
         </a:defRPr>

</xml_diff>